<commit_message>
Actualizar el README para el feedback
</commit_message>
<xml_diff>
--- a/presentación/Pypolis - la presentación.pptx
+++ b/presentación/Pypolis - la presentación.pptx
@@ -139,7 +139,7 @@
       </p:grpSpPr>
       <p:sp>
         <p:nvSpPr>
-          <p:cNvPr id="1705900990" name="Marcador de encabezado 1"/>
+          <p:cNvPr id="1285646331" name="Marcador de encabezado 1"/>
           <p:cNvSpPr>
             <a:spLocks noGrp="1"/>
           </p:cNvSpPr>
@@ -173,7 +173,7 @@
       </p:sp>
       <p:sp>
         <p:nvSpPr>
-          <p:cNvPr id="1114834569" name="Marcador de fecha 2"/>
+          <p:cNvPr id="373613850" name="Marcador de fecha 2"/>
           <p:cNvSpPr>
             <a:spLocks noGrp="1"/>
           </p:cNvSpPr>
@@ -211,7 +211,7 @@
       </p:sp>
       <p:sp>
         <p:nvSpPr>
-          <p:cNvPr id="679433286" name="Marcador de imagen de diapositiva 3"/>
+          <p:cNvPr id="899619165" name="Marcador de imagen de diapositiva 3"/>
           <p:cNvSpPr>
             <a:spLocks noChangeAspect="1" noGrp="1" noRot="1"/>
           </p:cNvSpPr>
@@ -247,7 +247,7 @@
       </p:sp>
       <p:sp>
         <p:nvSpPr>
-          <p:cNvPr id="1391367000" name="Marcador de notas 4"/>
+          <p:cNvPr id="1026325562" name="Marcador de notas 4"/>
           <p:cNvSpPr>
             <a:spLocks noGrp="1"/>
           </p:cNvSpPr>
@@ -321,7 +321,7 @@
       </p:sp>
       <p:sp>
         <p:nvSpPr>
-          <p:cNvPr id="144598890" name="Marcador de pie de página 5"/>
+          <p:cNvPr id="360796821" name="Marcador de pie de página 5"/>
           <p:cNvSpPr>
             <a:spLocks noGrp="1"/>
           </p:cNvSpPr>
@@ -355,7 +355,7 @@
       </p:sp>
       <p:sp>
         <p:nvSpPr>
-          <p:cNvPr id="134565860" name="Marcador de número de diapositiva 6"/>
+          <p:cNvPr id="725367612" name="Marcador de número de diapositiva 6"/>
           <p:cNvSpPr>
             <a:spLocks noGrp="1"/>
           </p:cNvSpPr>
@@ -508,7 +508,7 @@
       </p:grpSpPr>
       <p:sp>
         <p:nvSpPr>
-          <p:cNvPr id="481579261" name="Marcador de imagen de diapositiva 1"/>
+          <p:cNvPr id="1298158890" name="Marcador de imagen de diapositiva 1"/>
           <p:cNvSpPr>
             <a:spLocks noChangeAspect="1" noGrp="1" noRot="1"/>
           </p:cNvSpPr>
@@ -525,7 +525,7 @@
       </p:sp>
       <p:sp>
         <p:nvSpPr>
-          <p:cNvPr id="427406870" name="Marcador de notas 4"/>
+          <p:cNvPr id="271299251" name="Marcador de notas 4"/>
           <p:cNvSpPr>
             <a:spLocks noGrp="1"/>
           </p:cNvSpPr>
@@ -550,7 +550,7 @@
       </p:sp>
       <p:sp>
         <p:nvSpPr>
-          <p:cNvPr id="1880169001" name="Marcador de número de diapositiva 3"/>
+          <p:cNvPr id="1571411689" name="Marcador de número de diapositiva 3"/>
           <p:cNvSpPr>
             <a:spLocks noGrp="1"/>
           </p:cNvSpPr>
@@ -598,7 +598,7 @@
       </p:grpSpPr>
       <p:sp>
         <p:nvSpPr>
-          <p:cNvPr id="755795023" name="Slide Image Placeholder 1"/>
+          <p:cNvPr id="815390145" name="Slide Image Placeholder 1"/>
           <p:cNvSpPr>
             <a:spLocks noChangeAspect="1" noGrp="1" noRot="1"/>
           </p:cNvSpPr>
@@ -610,7 +610,7 @@
       </p:sp>
       <p:sp>
         <p:nvSpPr>
-          <p:cNvPr id="13592373" name="Notes Placeholder 2"/>
+          <p:cNvPr id="318252538" name="Notes Placeholder 2"/>
           <p:cNvSpPr>
             <a:spLocks noGrp="1"/>
           </p:cNvSpPr>
@@ -632,7 +632,7 @@
       </p:sp>
       <p:sp>
         <p:nvSpPr>
-          <p:cNvPr id="1441959731" name="Slide Number Placeholder 3"/>
+          <p:cNvPr id="2077555821" name="Slide Number Placeholder 3"/>
           <p:cNvSpPr>
             <a:spLocks noGrp="1"/>
           </p:cNvSpPr>
@@ -680,7 +680,7 @@
       </p:grpSpPr>
       <p:sp>
         <p:nvSpPr>
-          <p:cNvPr id="2009061080" name="Slide Image Placeholder 1"/>
+          <p:cNvPr id="1344022550" name="Slide Image Placeholder 1"/>
           <p:cNvSpPr>
             <a:spLocks noChangeAspect="1" noGrp="1" noRot="1"/>
           </p:cNvSpPr>
@@ -692,7 +692,7 @@
       </p:sp>
       <p:sp>
         <p:nvSpPr>
-          <p:cNvPr id="1686027200" name="Notes Placeholder 2"/>
+          <p:cNvPr id="2129395598" name="Notes Placeholder 2"/>
           <p:cNvSpPr>
             <a:spLocks noGrp="1"/>
           </p:cNvSpPr>
@@ -714,7 +714,7 @@
       </p:sp>
       <p:sp>
         <p:nvSpPr>
-          <p:cNvPr id="83973120" name="Slide Number Placeholder 3"/>
+          <p:cNvPr id="182512911" name="Slide Number Placeholder 3"/>
           <p:cNvSpPr>
             <a:spLocks noGrp="1"/>
           </p:cNvSpPr>
@@ -762,7 +762,7 @@
       </p:grpSpPr>
       <p:sp>
         <p:nvSpPr>
-          <p:cNvPr id="1059612378" name="Slide Image Placeholder 1"/>
+          <p:cNvPr id="1700675140" name="Slide Image Placeholder 1"/>
           <p:cNvSpPr>
             <a:spLocks noChangeAspect="1" noGrp="1" noRot="1"/>
           </p:cNvSpPr>
@@ -774,7 +774,7 @@
       </p:sp>
       <p:sp>
         <p:nvSpPr>
-          <p:cNvPr id="1916235771" name="Notes Placeholder 2"/>
+          <p:cNvPr id="877725312" name="Notes Placeholder 2"/>
           <p:cNvSpPr>
             <a:spLocks noGrp="1"/>
           </p:cNvSpPr>
@@ -796,7 +796,7 @@
       </p:sp>
       <p:sp>
         <p:nvSpPr>
-          <p:cNvPr id="880884861" name="Slide Number Placeholder 3"/>
+          <p:cNvPr id="2085170736" name="Slide Number Placeholder 3"/>
           <p:cNvSpPr>
             <a:spLocks noGrp="1"/>
           </p:cNvSpPr>
@@ -844,7 +844,7 @@
       </p:grpSpPr>
       <p:sp>
         <p:nvSpPr>
-          <p:cNvPr id="231079409" name="Slide Image Placeholder 1"/>
+          <p:cNvPr id="240185362" name="Slide Image Placeholder 1"/>
           <p:cNvSpPr>
             <a:spLocks noChangeAspect="1" noGrp="1" noRot="1"/>
           </p:cNvSpPr>
@@ -856,7 +856,7 @@
       </p:sp>
       <p:sp>
         <p:nvSpPr>
-          <p:cNvPr id="1963361706" name="Notes Placeholder 2"/>
+          <p:cNvPr id="888882008" name="Notes Placeholder 2"/>
           <p:cNvSpPr>
             <a:spLocks noGrp="1"/>
           </p:cNvSpPr>
@@ -878,7 +878,7 @@
       </p:sp>
       <p:sp>
         <p:nvSpPr>
-          <p:cNvPr id="1438369708" name="Slide Number Placeholder 3"/>
+          <p:cNvPr id="319579403" name="Slide Number Placeholder 3"/>
           <p:cNvSpPr>
             <a:spLocks noGrp="1"/>
           </p:cNvSpPr>
@@ -926,7 +926,7 @@
       </p:grpSpPr>
       <p:sp>
         <p:nvSpPr>
-          <p:cNvPr id="9807120" name="Slide Image Placeholder 1"/>
+          <p:cNvPr id="1872204773" name="Slide Image Placeholder 1"/>
           <p:cNvSpPr>
             <a:spLocks noChangeAspect="1" noGrp="1" noRot="1"/>
           </p:cNvSpPr>
@@ -938,7 +938,7 @@
       </p:sp>
       <p:sp>
         <p:nvSpPr>
-          <p:cNvPr id="1385033279" name="Notes Placeholder 2"/>
+          <p:cNvPr id="710454573" name="Notes Placeholder 2"/>
           <p:cNvSpPr>
             <a:spLocks noGrp="1"/>
           </p:cNvSpPr>
@@ -960,7 +960,7 @@
       </p:sp>
       <p:sp>
         <p:nvSpPr>
-          <p:cNvPr id="2053731716" name="Slide Number Placeholder 3"/>
+          <p:cNvPr id="509952054" name="Slide Number Placeholder 3"/>
           <p:cNvSpPr>
             <a:spLocks noGrp="1"/>
           </p:cNvSpPr>
@@ -1008,7 +1008,7 @@
       </p:grpSpPr>
       <p:sp>
         <p:nvSpPr>
-          <p:cNvPr id="1912430943" name="Título 1"/>
+          <p:cNvPr id="918501158" name="Título 1"/>
           <p:cNvSpPr>
             <a:spLocks noGrp="1"/>
           </p:cNvSpPr>
@@ -1043,7 +1043,7 @@
       </p:sp>
       <p:sp>
         <p:nvSpPr>
-          <p:cNvPr id="1675890762" name="Subtítulo 2"/>
+          <p:cNvPr id="453639696" name="Subtítulo 2"/>
           <p:cNvSpPr>
             <a:spLocks noGrp="1"/>
           </p:cNvSpPr>
@@ -1111,7 +1111,7 @@
       </p:sp>
       <p:sp>
         <p:nvSpPr>
-          <p:cNvPr id="1235080853" name="Marcador de fecha 3"/>
+          <p:cNvPr id="1773772580" name="Marcador de fecha 3"/>
           <p:cNvSpPr>
             <a:spLocks noGrp="1"/>
           </p:cNvSpPr>
@@ -1137,7 +1137,7 @@
       </p:sp>
       <p:sp>
         <p:nvSpPr>
-          <p:cNvPr id="146923156" name="Marcador de pie de página 4"/>
+          <p:cNvPr id="456157383" name="Marcador de pie de página 4"/>
           <p:cNvSpPr>
             <a:spLocks noGrp="1"/>
           </p:cNvSpPr>
@@ -1159,7 +1159,7 @@
       </p:sp>
       <p:sp>
         <p:nvSpPr>
-          <p:cNvPr id="545605508" name="Marcador de número de diapositiva 5"/>
+          <p:cNvPr id="1902395562" name="Marcador de número de diapositiva 5"/>
           <p:cNvSpPr>
             <a:spLocks noGrp="1"/>
           </p:cNvSpPr>
@@ -1210,7 +1210,7 @@
       </p:grpSpPr>
       <p:sp>
         <p:nvSpPr>
-          <p:cNvPr id="155367564" name="Título 1"/>
+          <p:cNvPr id="1325866052" name="Título 1"/>
           <p:cNvSpPr>
             <a:spLocks noGrp="1"/>
           </p:cNvSpPr>
@@ -1236,7 +1236,7 @@
       </p:sp>
       <p:sp>
         <p:nvSpPr>
-          <p:cNvPr id="14277660" name="Marcador de texto vertical 2"/>
+          <p:cNvPr id="712970736" name="Marcador de texto vertical 2"/>
           <p:cNvSpPr>
             <a:spLocks noGrp="1"/>
           </p:cNvSpPr>
@@ -1302,7 +1302,7 @@
       </p:sp>
       <p:sp>
         <p:nvSpPr>
-          <p:cNvPr id="813891600" name="Marcador de fecha 3"/>
+          <p:cNvPr id="252248616" name="Marcador de fecha 3"/>
           <p:cNvSpPr>
             <a:spLocks noGrp="1"/>
           </p:cNvSpPr>
@@ -1328,7 +1328,7 @@
       </p:sp>
       <p:sp>
         <p:nvSpPr>
-          <p:cNvPr id="128587569" name="Marcador de pie de página 4"/>
+          <p:cNvPr id="1328479270" name="Marcador de pie de página 4"/>
           <p:cNvSpPr>
             <a:spLocks noGrp="1"/>
           </p:cNvSpPr>
@@ -1350,7 +1350,7 @@
       </p:sp>
       <p:sp>
         <p:nvSpPr>
-          <p:cNvPr id="1474210197" name="Marcador de número de diapositiva 5"/>
+          <p:cNvPr id="1208006503" name="Marcador de número de diapositiva 5"/>
           <p:cNvSpPr>
             <a:spLocks noGrp="1"/>
           </p:cNvSpPr>
@@ -1401,7 +1401,7 @@
       </p:grpSpPr>
       <p:sp>
         <p:nvSpPr>
-          <p:cNvPr id="1345269254" name="Título vertical 1"/>
+          <p:cNvPr id="1501392818" name="Título vertical 1"/>
           <p:cNvSpPr>
             <a:spLocks noGrp="1"/>
           </p:cNvSpPr>
@@ -1432,7 +1432,7 @@
       </p:sp>
       <p:sp>
         <p:nvSpPr>
-          <p:cNvPr id="1439709067" name="Marcador de texto vertical 2"/>
+          <p:cNvPr id="579206711" name="Marcador de texto vertical 2"/>
           <p:cNvSpPr>
             <a:spLocks noGrp="1"/>
           </p:cNvSpPr>
@@ -1503,7 +1503,7 @@
       </p:sp>
       <p:sp>
         <p:nvSpPr>
-          <p:cNvPr id="2137170529" name="Marcador de fecha 3"/>
+          <p:cNvPr id="1722281823" name="Marcador de fecha 3"/>
           <p:cNvSpPr>
             <a:spLocks noGrp="1"/>
           </p:cNvSpPr>
@@ -1529,7 +1529,7 @@
       </p:sp>
       <p:sp>
         <p:nvSpPr>
-          <p:cNvPr id="1165298144" name="Marcador de pie de página 4"/>
+          <p:cNvPr id="1080709614" name="Marcador de pie de página 4"/>
           <p:cNvSpPr>
             <a:spLocks noGrp="1"/>
           </p:cNvSpPr>
@@ -1551,7 +1551,7 @@
       </p:sp>
       <p:sp>
         <p:nvSpPr>
-          <p:cNvPr id="623762652" name="Marcador de número de diapositiva 5"/>
+          <p:cNvPr id="554015328" name="Marcador de número de diapositiva 5"/>
           <p:cNvSpPr>
             <a:spLocks noGrp="1"/>
           </p:cNvSpPr>
@@ -1602,7 +1602,7 @@
       </p:grpSpPr>
       <p:sp>
         <p:nvSpPr>
-          <p:cNvPr id="660084273" name="Title 1"/>
+          <p:cNvPr id="1411208292" name="Title 1"/>
           <p:cNvSpPr>
             <a:spLocks noGrp="1"/>
           </p:cNvSpPr>
@@ -1628,7 +1628,7 @@
       </p:sp>
       <p:sp>
         <p:nvSpPr>
-          <p:cNvPr id="1572326911" name="Marcador de contenido 2"/>
+          <p:cNvPr id="1592295638" name="Marcador de contenido 2"/>
           <p:cNvSpPr>
             <a:spLocks noGrp="1"/>
           </p:cNvSpPr>
@@ -1694,7 +1694,7 @@
       </p:sp>
       <p:sp>
         <p:nvSpPr>
-          <p:cNvPr id="868156877" name="Marcador de fecha 3"/>
+          <p:cNvPr id="493571410" name="Marcador de fecha 3"/>
           <p:cNvSpPr>
             <a:spLocks noGrp="1"/>
           </p:cNvSpPr>
@@ -1720,7 +1720,7 @@
       </p:sp>
       <p:sp>
         <p:nvSpPr>
-          <p:cNvPr id="333983881" name="Marcador de pie de página 4"/>
+          <p:cNvPr id="1958487" name="Marcador de pie de página 4"/>
           <p:cNvSpPr>
             <a:spLocks noGrp="1"/>
           </p:cNvSpPr>
@@ -1742,7 +1742,7 @@
       </p:sp>
       <p:sp>
         <p:nvSpPr>
-          <p:cNvPr id="875700250" name="Marcador de número de diapositiva 5"/>
+          <p:cNvPr id="1945526722" name="Marcador de número de diapositiva 5"/>
           <p:cNvSpPr>
             <a:spLocks noGrp="1"/>
           </p:cNvSpPr>
@@ -1793,7 +1793,7 @@
       </p:grpSpPr>
       <p:sp>
         <p:nvSpPr>
-          <p:cNvPr id="2065446802" name="Título 1"/>
+          <p:cNvPr id="865628778" name="Título 1"/>
           <p:cNvSpPr>
             <a:spLocks noGrp="1"/>
           </p:cNvSpPr>
@@ -1828,7 +1828,7 @@
       </p:sp>
       <p:sp>
         <p:nvSpPr>
-          <p:cNvPr id="835364222" name="Marcador de texto 2"/>
+          <p:cNvPr id="24393558" name="Marcador de texto 2"/>
           <p:cNvSpPr>
             <a:spLocks noGrp="1"/>
           </p:cNvSpPr>
@@ -1950,7 +1950,7 @@
       </p:sp>
       <p:sp>
         <p:nvSpPr>
-          <p:cNvPr id="1774956921" name="Marcador de fecha 3"/>
+          <p:cNvPr id="1076826844" name="Marcador de fecha 3"/>
           <p:cNvSpPr>
             <a:spLocks noGrp="1"/>
           </p:cNvSpPr>
@@ -1976,7 +1976,7 @@
       </p:sp>
       <p:sp>
         <p:nvSpPr>
-          <p:cNvPr id="375940251" name="Marcador de pie de página 4"/>
+          <p:cNvPr id="580533818" name="Marcador de pie de página 4"/>
           <p:cNvSpPr>
             <a:spLocks noGrp="1"/>
           </p:cNvSpPr>
@@ -1998,7 +1998,7 @@
       </p:sp>
       <p:sp>
         <p:nvSpPr>
-          <p:cNvPr id="1440859155" name="Marcador de número de diapositiva 5"/>
+          <p:cNvPr id="1327918058" name="Marcador de número de diapositiva 5"/>
           <p:cNvSpPr>
             <a:spLocks noGrp="1"/>
           </p:cNvSpPr>
@@ -2049,7 +2049,7 @@
       </p:grpSpPr>
       <p:sp>
         <p:nvSpPr>
-          <p:cNvPr id="547574351" name="Título 1"/>
+          <p:cNvPr id="1985528009" name="Título 1"/>
           <p:cNvSpPr>
             <a:spLocks noGrp="1"/>
           </p:cNvSpPr>
@@ -2075,7 +2075,7 @@
       </p:sp>
       <p:sp>
         <p:nvSpPr>
-          <p:cNvPr id="579891677" name="Marcador de contenido 2"/>
+          <p:cNvPr id="1493977004" name="Marcador de contenido 2"/>
           <p:cNvSpPr>
             <a:spLocks noGrp="1"/>
           </p:cNvSpPr>
@@ -2146,7 +2146,7 @@
       </p:sp>
       <p:sp>
         <p:nvSpPr>
-          <p:cNvPr id="20172345" name="Marcador de contenido 3"/>
+          <p:cNvPr id="131892051" name="Marcador de contenido 3"/>
           <p:cNvSpPr>
             <a:spLocks noGrp="1"/>
           </p:cNvSpPr>
@@ -2217,7 +2217,7 @@
       </p:sp>
       <p:sp>
         <p:nvSpPr>
-          <p:cNvPr id="1655161822" name="Marcador de fecha 4"/>
+          <p:cNvPr id="178461459" name="Marcador de fecha 4"/>
           <p:cNvSpPr>
             <a:spLocks noGrp="1"/>
           </p:cNvSpPr>
@@ -2243,7 +2243,7 @@
       </p:sp>
       <p:sp>
         <p:nvSpPr>
-          <p:cNvPr id="630464714" name="Marcador de pie de página 5"/>
+          <p:cNvPr id="1934997332" name="Marcador de pie de página 5"/>
           <p:cNvSpPr>
             <a:spLocks noGrp="1"/>
           </p:cNvSpPr>
@@ -2265,7 +2265,7 @@
       </p:sp>
       <p:sp>
         <p:nvSpPr>
-          <p:cNvPr id="1375058480" name="Marcador de número de diapositiva 6"/>
+          <p:cNvPr id="345396189" name="Marcador de número de diapositiva 6"/>
           <p:cNvSpPr>
             <a:spLocks noGrp="1"/>
           </p:cNvSpPr>
@@ -2316,7 +2316,7 @@
       </p:grpSpPr>
       <p:sp>
         <p:nvSpPr>
-          <p:cNvPr id="1249378699" name="Título 1"/>
+          <p:cNvPr id="1347228905" name="Título 1"/>
           <p:cNvSpPr>
             <a:spLocks noGrp="1"/>
           </p:cNvSpPr>
@@ -2347,7 +2347,7 @@
       </p:sp>
       <p:sp>
         <p:nvSpPr>
-          <p:cNvPr id="2034901148" name="Marcador de texto 2"/>
+          <p:cNvPr id="2059518042" name="Marcador de texto 2"/>
           <p:cNvSpPr>
             <a:spLocks noGrp="1"/>
           </p:cNvSpPr>
@@ -2415,7 +2415,7 @@
       </p:sp>
       <p:sp>
         <p:nvSpPr>
-          <p:cNvPr id="1432868843" name="Marcador de contenido 3"/>
+          <p:cNvPr id="925011029" name="Marcador de contenido 3"/>
           <p:cNvSpPr>
             <a:spLocks noGrp="1"/>
           </p:cNvSpPr>
@@ -2486,7 +2486,7 @@
       </p:sp>
       <p:sp>
         <p:nvSpPr>
-          <p:cNvPr id="473590180" name="Marcador de texto 4"/>
+          <p:cNvPr id="1919129944" name="Marcador de texto 4"/>
           <p:cNvSpPr>
             <a:spLocks noGrp="1"/>
           </p:cNvSpPr>
@@ -2554,7 +2554,7 @@
       </p:sp>
       <p:sp>
         <p:nvSpPr>
-          <p:cNvPr id="753348653" name="Marcador de contenido 5"/>
+          <p:cNvPr id="2006432376" name="Marcador de contenido 5"/>
           <p:cNvSpPr>
             <a:spLocks noGrp="1"/>
           </p:cNvSpPr>
@@ -2625,7 +2625,7 @@
       </p:sp>
       <p:sp>
         <p:nvSpPr>
-          <p:cNvPr id="2146666104" name="Marcador de fecha 6"/>
+          <p:cNvPr id="1437484534" name="Marcador de fecha 6"/>
           <p:cNvSpPr>
             <a:spLocks noGrp="1"/>
           </p:cNvSpPr>
@@ -2651,7 +2651,7 @@
       </p:sp>
       <p:sp>
         <p:nvSpPr>
-          <p:cNvPr id="2002963433" name="Marcador de pie de página 7"/>
+          <p:cNvPr id="839453173" name="Marcador de pie de página 7"/>
           <p:cNvSpPr>
             <a:spLocks noGrp="1"/>
           </p:cNvSpPr>
@@ -2673,7 +2673,7 @@
       </p:sp>
       <p:sp>
         <p:nvSpPr>
-          <p:cNvPr id="1929548372" name="Marcador de número de diapositiva 8"/>
+          <p:cNvPr id="223526846" name="Marcador de número de diapositiva 8"/>
           <p:cNvSpPr>
             <a:spLocks noGrp="1"/>
           </p:cNvSpPr>
@@ -2724,7 +2724,7 @@
       </p:grpSpPr>
       <p:sp>
         <p:nvSpPr>
-          <p:cNvPr id="1046803324" name="Título 1"/>
+          <p:cNvPr id="885650318" name="Título 1"/>
           <p:cNvSpPr>
             <a:spLocks noGrp="1"/>
           </p:cNvSpPr>
@@ -2750,7 +2750,7 @@
       </p:sp>
       <p:sp>
         <p:nvSpPr>
-          <p:cNvPr id="477373390" name="Marcador de fecha 2"/>
+          <p:cNvPr id="2016536303" name="Marcador de fecha 2"/>
           <p:cNvSpPr>
             <a:spLocks noGrp="1"/>
           </p:cNvSpPr>
@@ -2776,7 +2776,7 @@
       </p:sp>
       <p:sp>
         <p:nvSpPr>
-          <p:cNvPr id="2072255580" name="Marcador de pie de página 3"/>
+          <p:cNvPr id="835169970" name="Marcador de pie de página 3"/>
           <p:cNvSpPr>
             <a:spLocks noGrp="1"/>
           </p:cNvSpPr>
@@ -2798,7 +2798,7 @@
       </p:sp>
       <p:sp>
         <p:nvSpPr>
-          <p:cNvPr id="1658046695" name="Marcador de número de diapositiva 4"/>
+          <p:cNvPr id="1828814327" name="Marcador de número de diapositiva 4"/>
           <p:cNvSpPr>
             <a:spLocks noGrp="1"/>
           </p:cNvSpPr>
@@ -2849,7 +2849,7 @@
       </p:grpSpPr>
       <p:sp>
         <p:nvSpPr>
-          <p:cNvPr id="1313603863" name="Marcador de fecha 1"/>
+          <p:cNvPr id="1419129302" name="Marcador de fecha 1"/>
           <p:cNvSpPr>
             <a:spLocks noGrp="1"/>
           </p:cNvSpPr>
@@ -2875,7 +2875,7 @@
       </p:sp>
       <p:sp>
         <p:nvSpPr>
-          <p:cNvPr id="1838890613" name="Marcador de pie de página 2"/>
+          <p:cNvPr id="628189506" name="Marcador de pie de página 2"/>
           <p:cNvSpPr>
             <a:spLocks noGrp="1"/>
           </p:cNvSpPr>
@@ -2897,7 +2897,7 @@
       </p:sp>
       <p:sp>
         <p:nvSpPr>
-          <p:cNvPr id="1186090594" name="Marcador de número de diapositiva 3"/>
+          <p:cNvPr id="1476944415" name="Marcador de número de diapositiva 3"/>
           <p:cNvSpPr>
             <a:spLocks noGrp="1"/>
           </p:cNvSpPr>
@@ -2948,7 +2948,7 @@
       </p:grpSpPr>
       <p:sp>
         <p:nvSpPr>
-          <p:cNvPr id="1968128837" name="Título 1"/>
+          <p:cNvPr id="940312115" name="Título 1"/>
           <p:cNvSpPr>
             <a:spLocks noGrp="1"/>
           </p:cNvSpPr>
@@ -2983,7 +2983,7 @@
       </p:sp>
       <p:sp>
         <p:nvSpPr>
-          <p:cNvPr id="1774734413" name="Marcador de contenido 2"/>
+          <p:cNvPr id="140568441" name="Marcador de contenido 2"/>
           <p:cNvSpPr>
             <a:spLocks noGrp="1"/>
           </p:cNvSpPr>
@@ -3082,7 +3082,7 @@
       </p:sp>
       <p:sp>
         <p:nvSpPr>
-          <p:cNvPr id="585247971" name="Marcador de texto 3"/>
+          <p:cNvPr id="733968826" name="Marcador de texto 3"/>
           <p:cNvSpPr>
             <a:spLocks noGrp="1"/>
           </p:cNvSpPr>
@@ -3150,7 +3150,7 @@
       </p:sp>
       <p:sp>
         <p:nvSpPr>
-          <p:cNvPr id="1095581177" name="Marcador de fecha 4"/>
+          <p:cNvPr id="644012802" name="Marcador de fecha 4"/>
           <p:cNvSpPr>
             <a:spLocks noGrp="1"/>
           </p:cNvSpPr>
@@ -3176,7 +3176,7 @@
       </p:sp>
       <p:sp>
         <p:nvSpPr>
-          <p:cNvPr id="1596278668" name="Marcador de pie de página 5"/>
+          <p:cNvPr id="74998863" name="Marcador de pie de página 5"/>
           <p:cNvSpPr>
             <a:spLocks noGrp="1"/>
           </p:cNvSpPr>
@@ -3198,7 +3198,7 @@
       </p:sp>
       <p:sp>
         <p:nvSpPr>
-          <p:cNvPr id="2062773036" name="Marcador de número de diapositiva 6"/>
+          <p:cNvPr id="402081264" name="Marcador de número de diapositiva 6"/>
           <p:cNvSpPr>
             <a:spLocks noGrp="1"/>
           </p:cNvSpPr>
@@ -3249,7 +3249,7 @@
       </p:grpSpPr>
       <p:sp>
         <p:nvSpPr>
-          <p:cNvPr id="2033703609" name="Título 1"/>
+          <p:cNvPr id="1171741453" name="Título 1"/>
           <p:cNvSpPr>
             <a:spLocks noGrp="1"/>
           </p:cNvSpPr>
@@ -3284,7 +3284,7 @@
       </p:sp>
       <p:sp>
         <p:nvSpPr>
-          <p:cNvPr id="1950608502" name="Marcador de posición de imagen 2"/>
+          <p:cNvPr id="404466679" name="Marcador de posición de imagen 2"/>
           <p:cNvSpPr>
             <a:spLocks noChangeAspect="1" noGrp="1"/>
           </p:cNvSpPr>
@@ -3352,7 +3352,7 @@
       </p:sp>
       <p:sp>
         <p:nvSpPr>
-          <p:cNvPr id="320206924" name="Marcador de texto 3"/>
+          <p:cNvPr id="573440710" name="Marcador de texto 3"/>
           <p:cNvSpPr>
             <a:spLocks noGrp="1"/>
           </p:cNvSpPr>
@@ -3420,7 +3420,7 @@
       </p:sp>
       <p:sp>
         <p:nvSpPr>
-          <p:cNvPr id="1209530832" name="Marcador de fecha 4"/>
+          <p:cNvPr id="298960129" name="Marcador de fecha 4"/>
           <p:cNvSpPr>
             <a:spLocks noGrp="1"/>
           </p:cNvSpPr>
@@ -3446,7 +3446,7 @@
       </p:sp>
       <p:sp>
         <p:nvSpPr>
-          <p:cNvPr id="1416037469" name="Marcador de pie de página 5"/>
+          <p:cNvPr id="1883378160" name="Marcador de pie de página 5"/>
           <p:cNvSpPr>
             <a:spLocks noGrp="1"/>
           </p:cNvSpPr>
@@ -3468,7 +3468,7 @@
       </p:sp>
       <p:sp>
         <p:nvSpPr>
-          <p:cNvPr id="1411902254" name="Marcador de número de diapositiva 6"/>
+          <p:cNvPr id="137238995" name="Marcador de número de diapositiva 6"/>
           <p:cNvSpPr>
             <a:spLocks noGrp="1"/>
           </p:cNvSpPr>
@@ -3537,7 +3537,7 @@
       </p:grpSpPr>
       <p:sp>
         <p:nvSpPr>
-          <p:cNvPr id="1091646767" name="Marcador de título 1"/>
+          <p:cNvPr id="1128016454" name="Marcador de título 1"/>
           <p:cNvSpPr>
             <a:spLocks noGrp="1"/>
           </p:cNvSpPr>
@@ -3573,7 +3573,7 @@
       </p:sp>
       <p:sp>
         <p:nvSpPr>
-          <p:cNvPr id="1575915960" name="Marcador de texto 2"/>
+          <p:cNvPr id="2081363292" name="Marcador de texto 2"/>
           <p:cNvSpPr>
             <a:spLocks noGrp="1"/>
           </p:cNvSpPr>
@@ -3649,7 +3649,7 @@
       </p:sp>
       <p:sp>
         <p:nvSpPr>
-          <p:cNvPr id="226103917" name="Marcador de fecha 3"/>
+          <p:cNvPr id="232960499" name="Marcador de fecha 3"/>
           <p:cNvSpPr>
             <a:spLocks noGrp="1"/>
           </p:cNvSpPr>
@@ -3693,7 +3693,7 @@
       </p:sp>
       <p:sp>
         <p:nvSpPr>
-          <p:cNvPr id="1761982673" name="Marcador de pie de página 4"/>
+          <p:cNvPr id="220517430" name="Marcador de pie de página 4"/>
           <p:cNvSpPr>
             <a:spLocks noGrp="1"/>
           </p:cNvSpPr>
@@ -3733,7 +3733,7 @@
       </p:sp>
       <p:sp>
         <p:nvSpPr>
-          <p:cNvPr id="979474813" name="Marcador de número de diapositiva 5"/>
+          <p:cNvPr id="897138197" name="Marcador de número de diapositiva 5"/>
           <p:cNvSpPr>
             <a:spLocks noGrp="1"/>
           </p:cNvSpPr>
@@ -4093,7 +4093,7 @@
       </p:grpSpPr>
       <p:sp>
         <p:nvSpPr>
-          <p:cNvPr id="1189023862" name="Título 1"/>
+          <p:cNvPr id="1341561390" name="Título 1"/>
           <p:cNvSpPr>
             <a:spLocks noGrp="1"/>
           </p:cNvSpPr>
@@ -4139,7 +4139,7 @@
       </p:sp>
       <p:sp>
         <p:nvSpPr>
-          <p:cNvPr id="632256606" name="Subtítulo 2"/>
+          <p:cNvPr id="1567735070" name="Subtítulo 2"/>
           <p:cNvSpPr>
             <a:spLocks noGrp="1"/>
           </p:cNvSpPr>
@@ -4206,7 +4206,7 @@
       </p:sp>
       <p:pic>
         <p:nvPicPr>
-          <p:cNvPr id="1495708497" name=""/>
+          <p:cNvPr id="559562589" name=""/>
           <p:cNvPicPr>
             <a:picLocks noChangeAspect="1"/>
           </p:cNvPicPr>
@@ -4230,7 +4230,7 @@
       </p:pic>
       <p:sp>
         <p:nvSpPr>
-          <p:cNvPr id="1741706282" name="Título 1"/>
+          <p:cNvPr id="1717331004" name="Título 1"/>
           <p:cNvSpPr>
             <a:spLocks noGrp="1"/>
           </p:cNvSpPr>
@@ -4369,7 +4369,7 @@
                                           </p:stCondLst>
                                         </p:cTn>
                                         <p:tgtEl>
-                                          <p:spTgt spid="1495708497"/>
+                                          <p:spTgt spid="559562589"/>
                                         </p:tgtEl>
                                         <p:attrNameLst>
                                           <p:attrName>style.visibility</p:attrName>
@@ -4383,7 +4383,7 @@
                                       <p:cBhvr additive="base">
                                         <p:cTn id="47" dur="741" fill="hold"/>
                                         <p:tgtEl>
-                                          <p:spTgt spid="1495708497"/>
+                                          <p:spTgt spid="559562589"/>
                                         </p:tgtEl>
                                         <p:attrNameLst>
                                           <p:attrName>ppt_x</p:attrName>
@@ -4406,7 +4406,7 @@
                                       <p:cBhvr additive="base">
                                         <p:cTn id="46" dur="741" fill="hold"/>
                                         <p:tgtEl>
-                                          <p:spTgt spid="1495708497"/>
+                                          <p:spTgt spid="559562589"/>
                                         </p:tgtEl>
                                         <p:attrNameLst>
                                           <p:attrName>ppt_y</p:attrName>
@@ -4451,7 +4451,7 @@
                                           </p:stCondLst>
                                         </p:cTn>
                                         <p:tgtEl>
-                                          <p:spTgt spid="1189023862"/>
+                                          <p:spTgt spid="1341561390"/>
                                         </p:tgtEl>
                                         <p:attrNameLst>
                                           <p:attrName>style.visibility</p:attrName>
@@ -4469,7 +4469,7 @@
                                           </p:stCondLst>
                                         </p:cTn>
                                         <p:tgtEl>
-                                          <p:spTgt spid="1189023862"/>
+                                          <p:spTgt spid="1341561390"/>
                                         </p:tgtEl>
                                       </p:cBhvr>
                                     </p:animEffect>
@@ -4481,7 +4481,7 @@
                                           </p:stCondLst>
                                         </p:cTn>
                                         <p:tgtEl>
-                                          <p:spTgt spid="1189023862"/>
+                                          <p:spTgt spid="1341561390"/>
                                         </p:tgtEl>
                                         <p:attrNameLst>
                                           <p:attrName>ppt_x</p:attrName>
@@ -4508,7 +4508,7 @@
                                           </p:stCondLst>
                                         </p:cTn>
                                         <p:tgtEl>
-                                          <p:spTgt spid="1189023862"/>
+                                          <p:spTgt spid="1341561390"/>
                                         </p:tgtEl>
                                         <p:attrNameLst>
                                           <p:attrName>ppt_y</p:attrName>
@@ -4535,7 +4535,7 @@
                                           </p:stCondLst>
                                         </p:cTn>
                                         <p:tgtEl>
-                                          <p:spTgt spid="1189023862"/>
+                                          <p:spTgt spid="1341561390"/>
                                         </p:tgtEl>
                                         <p:attrNameLst>
                                           <p:attrName>ppt_y</p:attrName>
@@ -4562,7 +4562,7 @@
                                           </p:stCondLst>
                                         </p:cTn>
                                         <p:tgtEl>
-                                          <p:spTgt spid="1189023862"/>
+                                          <p:spTgt spid="1341561390"/>
                                         </p:tgtEl>
                                         <p:attrNameLst>
                                           <p:attrName>ppt_y</p:attrName>
@@ -4589,7 +4589,7 @@
                                           </p:stCondLst>
                                         </p:cTn>
                                         <p:tgtEl>
-                                          <p:spTgt spid="1189023862"/>
+                                          <p:spTgt spid="1341561390"/>
                                         </p:tgtEl>
                                         <p:attrNameLst>
                                           <p:attrName>ppt_y</p:attrName>
@@ -4616,7 +4616,7 @@
                                           </p:stCondLst>
                                         </p:cTn>
                                         <p:tgtEl>
-                                          <p:spTgt spid="1189023862"/>
+                                          <p:spTgt spid="1341561390"/>
                                         </p:tgtEl>
                                       </p:cBhvr>
                                       <p:to x="100000" y="60000"/>
@@ -4629,7 +4629,7 @@
                                           </p:stCondLst>
                                         </p:cTn>
                                         <p:tgtEl>
-                                          <p:spTgt spid="1189023862"/>
+                                          <p:spTgt spid="1341561390"/>
                                         </p:tgtEl>
                                       </p:cBhvr>
                                       <p:to x="100000" y="100000"/>
@@ -4642,7 +4642,7 @@
                                           </p:stCondLst>
                                         </p:cTn>
                                         <p:tgtEl>
-                                          <p:spTgt spid="1189023862"/>
+                                          <p:spTgt spid="1341561390"/>
                                         </p:tgtEl>
                                       </p:cBhvr>
                                       <p:to x="100000" y="80000"/>
@@ -4655,7 +4655,7 @@
                                           </p:stCondLst>
                                         </p:cTn>
                                         <p:tgtEl>
-                                          <p:spTgt spid="1189023862"/>
+                                          <p:spTgt spid="1341561390"/>
                                         </p:tgtEl>
                                       </p:cBhvr>
                                       <p:to x="100000" y="100000"/>
@@ -4668,7 +4668,7 @@
                                           </p:stCondLst>
                                         </p:cTn>
                                         <p:tgtEl>
-                                          <p:spTgt spid="1189023862"/>
+                                          <p:spTgt spid="1341561390"/>
                                         </p:tgtEl>
                                       </p:cBhvr>
                                       <p:to x="100000" y="90000"/>
@@ -4681,7 +4681,7 @@
                                           </p:stCondLst>
                                         </p:cTn>
                                         <p:tgtEl>
-                                          <p:spTgt spid="1189023862"/>
+                                          <p:spTgt spid="1341561390"/>
                                         </p:tgtEl>
                                       </p:cBhvr>
                                       <p:to x="100000" y="100000"/>
@@ -4694,7 +4694,7 @@
                                           </p:stCondLst>
                                         </p:cTn>
                                         <p:tgtEl>
-                                          <p:spTgt spid="1189023862"/>
+                                          <p:spTgt spid="1341561390"/>
                                         </p:tgtEl>
                                       </p:cBhvr>
                                       <p:to x="100000" y="95000"/>
@@ -4707,7 +4707,7 @@
                                           </p:stCondLst>
                                         </p:cTn>
                                         <p:tgtEl>
-                                          <p:spTgt spid="1189023862"/>
+                                          <p:spTgt spid="1341561390"/>
                                         </p:tgtEl>
                                       </p:cBhvr>
                                       <p:to x="100000" y="100000"/>
@@ -4738,7 +4738,7 @@
                                           </p:stCondLst>
                                         </p:cTn>
                                         <p:tgtEl>
-                                          <p:spTgt spid="1741706282"/>
+                                          <p:spTgt spid="1717331004"/>
                                         </p:tgtEl>
                                         <p:attrNameLst>
                                           <p:attrName>style.visibility</p:attrName>
@@ -4756,7 +4756,7 @@
                                           </p:stCondLst>
                                         </p:cTn>
                                         <p:tgtEl>
-                                          <p:spTgt spid="1741706282"/>
+                                          <p:spTgt spid="1717331004"/>
                                         </p:tgtEl>
                                       </p:cBhvr>
                                     </p:animEffect>
@@ -4768,7 +4768,7 @@
                                           </p:stCondLst>
                                         </p:cTn>
                                         <p:tgtEl>
-                                          <p:spTgt spid="1741706282"/>
+                                          <p:spTgt spid="1717331004"/>
                                         </p:tgtEl>
                                         <p:attrNameLst>
                                           <p:attrName>ppt_x</p:attrName>
@@ -4795,7 +4795,7 @@
                                           </p:stCondLst>
                                         </p:cTn>
                                         <p:tgtEl>
-                                          <p:spTgt spid="1741706282"/>
+                                          <p:spTgt spid="1717331004"/>
                                         </p:tgtEl>
                                         <p:attrNameLst>
                                           <p:attrName>ppt_y</p:attrName>
@@ -4822,7 +4822,7 @@
                                           </p:stCondLst>
                                         </p:cTn>
                                         <p:tgtEl>
-                                          <p:spTgt spid="1741706282"/>
+                                          <p:spTgt spid="1717331004"/>
                                         </p:tgtEl>
                                         <p:attrNameLst>
                                           <p:attrName>ppt_y</p:attrName>
@@ -4849,7 +4849,7 @@
                                           </p:stCondLst>
                                         </p:cTn>
                                         <p:tgtEl>
-                                          <p:spTgt spid="1741706282"/>
+                                          <p:spTgt spid="1717331004"/>
                                         </p:tgtEl>
                                         <p:attrNameLst>
                                           <p:attrName>ppt_y</p:attrName>
@@ -4876,7 +4876,7 @@
                                           </p:stCondLst>
                                         </p:cTn>
                                         <p:tgtEl>
-                                          <p:spTgt spid="1741706282"/>
+                                          <p:spTgt spid="1717331004"/>
                                         </p:tgtEl>
                                         <p:attrNameLst>
                                           <p:attrName>ppt_y</p:attrName>
@@ -4903,7 +4903,7 @@
                                           </p:stCondLst>
                                         </p:cTn>
                                         <p:tgtEl>
-                                          <p:spTgt spid="1741706282"/>
+                                          <p:spTgt spid="1717331004"/>
                                         </p:tgtEl>
                                       </p:cBhvr>
                                       <p:to x="100000" y="60000"/>
@@ -4916,7 +4916,7 @@
                                           </p:stCondLst>
                                         </p:cTn>
                                         <p:tgtEl>
-                                          <p:spTgt spid="1741706282"/>
+                                          <p:spTgt spid="1717331004"/>
                                         </p:tgtEl>
                                       </p:cBhvr>
                                       <p:to x="100000" y="100000"/>
@@ -4929,7 +4929,7 @@
                                           </p:stCondLst>
                                         </p:cTn>
                                         <p:tgtEl>
-                                          <p:spTgt spid="1741706282"/>
+                                          <p:spTgt spid="1717331004"/>
                                         </p:tgtEl>
                                       </p:cBhvr>
                                       <p:to x="100000" y="80000"/>
@@ -4942,7 +4942,7 @@
                                           </p:stCondLst>
                                         </p:cTn>
                                         <p:tgtEl>
-                                          <p:spTgt spid="1741706282"/>
+                                          <p:spTgt spid="1717331004"/>
                                         </p:tgtEl>
                                       </p:cBhvr>
                                       <p:to x="100000" y="100000"/>
@@ -4955,7 +4955,7 @@
                                           </p:stCondLst>
                                         </p:cTn>
                                         <p:tgtEl>
-                                          <p:spTgt spid="1741706282"/>
+                                          <p:spTgt spid="1717331004"/>
                                         </p:tgtEl>
                                       </p:cBhvr>
                                       <p:to x="100000" y="90000"/>
@@ -4968,7 +4968,7 @@
                                           </p:stCondLst>
                                         </p:cTn>
                                         <p:tgtEl>
-                                          <p:spTgt spid="1741706282"/>
+                                          <p:spTgt spid="1717331004"/>
                                         </p:tgtEl>
                                       </p:cBhvr>
                                       <p:to x="100000" y="100000"/>
@@ -4981,7 +4981,7 @@
                                           </p:stCondLst>
                                         </p:cTn>
                                         <p:tgtEl>
-                                          <p:spTgt spid="1741706282"/>
+                                          <p:spTgt spid="1717331004"/>
                                         </p:tgtEl>
                                       </p:cBhvr>
                                       <p:to x="100000" y="95000"/>
@@ -4994,7 +4994,7 @@
                                           </p:stCondLst>
                                         </p:cTn>
                                         <p:tgtEl>
-                                          <p:spTgt spid="1741706282"/>
+                                          <p:spTgt spid="1717331004"/>
                                         </p:tgtEl>
                                       </p:cBhvr>
                                       <p:to x="100000" y="100000"/>
@@ -5025,7 +5025,7 @@
                                           </p:stCondLst>
                                         </p:cTn>
                                         <p:tgtEl>
-                                          <p:spTgt spid="632256606"/>
+                                          <p:spTgt spid="1567735070"/>
                                         </p:tgtEl>
                                         <p:attrNameLst>
                                           <p:attrName>style.visibility</p:attrName>
@@ -5039,7 +5039,7 @@
                                       <p:cBhvr>
                                         <p:cTn id="8" dur="500" fill="hold"/>
                                         <p:tgtEl>
-                                          <p:spTgt spid="632256606"/>
+                                          <p:spTgt spid="1567735070"/>
                                         </p:tgtEl>
                                         <p:attrNameLst>
                                           <p:attrName>ppt_w</p:attrName>
@@ -5062,7 +5062,7 @@
                                       <p:cBhvr>
                                         <p:cTn id="7" dur="500" fill="hold"/>
                                         <p:tgtEl>
-                                          <p:spTgt spid="632256606"/>
+                                          <p:spTgt spid="1567735070"/>
                                         </p:tgtEl>
                                         <p:attrNameLst>
                                           <p:attrName>ppt_h</p:attrName>
@@ -5085,7 +5085,7 @@
                                       <p:cBhvr>
                                         <p:cTn id="6" dur="500"/>
                                         <p:tgtEl>
-                                          <p:spTgt spid="632256606"/>
+                                          <p:spTgt spid="1567735070"/>
                                         </p:tgtEl>
                                       </p:cBhvr>
                                     </p:animEffect>
@@ -5160,7 +5160,7 @@
       </p:grpSpPr>
       <p:sp>
         <p:nvSpPr>
-          <p:cNvPr id="1069111615" name="Title 1"/>
+          <p:cNvPr id="1949563588" name="Title 1"/>
           <p:cNvSpPr>
             <a:spLocks noGrp="1"/>
           </p:cNvSpPr>
@@ -5198,7 +5198,7 @@
       </p:sp>
       <p:sp>
         <p:nvSpPr>
-          <p:cNvPr id="1906534366" name="Marcador de contenido 2"/>
+          <p:cNvPr id="1823856362" name="Marcador de contenido 2"/>
           <p:cNvSpPr>
             <a:spLocks noGrp="1"/>
           </p:cNvSpPr>
@@ -5290,7 +5290,7 @@
       </p:sp>
       <p:pic>
         <p:nvPicPr>
-          <p:cNvPr id="570017508" name=""/>
+          <p:cNvPr id="980474211" name=""/>
           <p:cNvPicPr>
             <a:picLocks noChangeAspect="1"/>
           </p:cNvPicPr>
@@ -5312,7 +5312,7 @@
       </p:pic>
       <p:sp>
         <p:nvSpPr>
-          <p:cNvPr id="197429737" name=""/>
+          <p:cNvPr id="1335267825" name=""/>
           <p:cNvSpPr/>
           <p:nvPr/>
         </p:nvSpPr>
@@ -5357,7 +5357,7 @@
       </p:sp>
       <p:pic>
         <p:nvPicPr>
-          <p:cNvPr id="1475110188" name=""/>
+          <p:cNvPr id="1845057466" name=""/>
           <p:cNvPicPr>
             <a:picLocks noChangeAspect="1"/>
           </p:cNvPicPr>
@@ -5377,42 +5377,6 @@
           </a:prstGeom>
         </p:spPr>
       </p:pic>
-      <p:sp>
-        <p:nvSpPr>
-          <p:cNvPr id="1551238798" name=""/>
-          <p:cNvSpPr/>
-          <p:nvPr/>
-        </p:nvSpPr>
-        <p:spPr bwMode="auto">
-          <a:xfrm flipH="0" flipV="0">
-            <a:off x="7470888" y="626644"/>
-            <a:ext cx="939966" cy="739440"/>
-          </a:xfrm>
-          <a:prstGeom prst="wedgeRoundRectCallout">
-            <a:avLst>
-              <a:gd name="adj1" fmla="val -20833"/>
-              <a:gd name="adj2" fmla="val 62500"/>
-              <a:gd name="adj3" fmla="val 16667"/>
-            </a:avLst>
-          </a:prstGeom>
-        </p:spPr>
-        <p:style>
-          <a:lnRef idx="2">
-            <a:schemeClr val="accent1">
-              <a:shade val="50000"/>
-            </a:schemeClr>
-          </a:lnRef>
-          <a:fillRef idx="1">
-            <a:schemeClr val="accent1"/>
-          </a:fillRef>
-          <a:effectRef idx="0">
-            <a:schemeClr val="accent1"/>
-          </a:effectRef>
-          <a:fontRef idx="minor">
-            <a:schemeClr val="lt1"/>
-          </a:fontRef>
-        </p:style>
-      </p:sp>
     </p:spTree>
   </p:cSld>
   <p:clrMapOvr>
@@ -5467,7 +5431,7 @@
                                           </p:stCondLst>
                                         </p:cTn>
                                         <p:tgtEl>
-                                          <p:spTgt spid="197429737"/>
+                                          <p:spTgt spid="1335267825"/>
                                         </p:tgtEl>
                                         <p:attrNameLst>
                                           <p:attrName>style.visibility</p:attrName>
@@ -5481,7 +5445,7 @@
                                       <p:cBhvr>
                                         <p:cTn id="27" dur="2000"/>
                                         <p:tgtEl>
-                                          <p:spTgt spid="197429737"/>
+                                          <p:spTgt spid="1335267825"/>
                                         </p:tgtEl>
                                       </p:cBhvr>
                                     </p:animEffect>
@@ -5511,7 +5475,7 @@
                                           </p:stCondLst>
                                         </p:cTn>
                                         <p:tgtEl>
-                                          <p:spTgt spid="1475110188"/>
+                                          <p:spTgt spid="1845057466"/>
                                         </p:tgtEl>
                                         <p:attrNameLst>
                                           <p:attrName>style.visibility</p:attrName>
@@ -5525,7 +5489,7 @@
                                       <p:cBhvr>
                                         <p:cTn id="23" dur="1005"/>
                                         <p:tgtEl>
-                                          <p:spTgt spid="1475110188"/>
+                                          <p:spTgt spid="1845057466"/>
                                         </p:tgtEl>
                                       </p:cBhvr>
                                     </p:animEffect>
@@ -5555,7 +5519,7 @@
                                           </p:stCondLst>
                                         </p:cTn>
                                         <p:tgtEl>
-                                          <p:spTgt spid="1069111615"/>
+                                          <p:spTgt spid="1949563588"/>
                                         </p:tgtEl>
                                         <p:attrNameLst>
                                           <p:attrName>style.visibility</p:attrName>
@@ -5569,7 +5533,7 @@
                                       <p:cBhvr>
                                         <p:cTn id="19" dur="1000"/>
                                         <p:tgtEl>
-                                          <p:spTgt spid="1069111615"/>
+                                          <p:spTgt spid="1949563588"/>
                                         </p:tgtEl>
                                       </p:cBhvr>
                                     </p:animEffect>
@@ -5577,7 +5541,7 @@
                                       <p:cBhvr>
                                         <p:cTn id="18" dur="1000" fill="hold"/>
                                         <p:tgtEl>
-                                          <p:spTgt spid="1069111615"/>
+                                          <p:spTgt spid="1949563588"/>
                                         </p:tgtEl>
                                         <p:attrNameLst>
                                           <p:attrName>ppt_x</p:attrName>
@@ -5600,7 +5564,7 @@
                                       <p:cBhvr>
                                         <p:cTn id="17" dur="1000" fill="hold"/>
                                         <p:tgtEl>
-                                          <p:spTgt spid="1069111615"/>
+                                          <p:spTgt spid="1949563588"/>
                                         </p:tgtEl>
                                         <p:attrNameLst>
                                           <p:attrName>ppt_y</p:attrName>
@@ -5645,7 +5609,7 @@
                                           </p:stCondLst>
                                         </p:cTn>
                                         <p:tgtEl>
-                                          <p:spTgt spid="1906534366"/>
+                                          <p:spTgt spid="1823856362"/>
                                         </p:tgtEl>
                                         <p:attrNameLst>
                                           <p:attrName>style.visibility</p:attrName>
@@ -5659,7 +5623,7 @@
                                       <p:cBhvr>
                                         <p:cTn id="13" dur="905"/>
                                         <p:tgtEl>
-                                          <p:spTgt spid="1906534366"/>
+                                          <p:spTgt spid="1823856362"/>
                                         </p:tgtEl>
                                       </p:cBhvr>
                                     </p:animEffect>
@@ -5689,7 +5653,7 @@
                                           </p:stCondLst>
                                         </p:cTn>
                                         <p:tgtEl>
-                                          <p:spTgt spid="570017508"/>
+                                          <p:spTgt spid="980474211"/>
                                         </p:tgtEl>
                                         <p:attrNameLst>
                                           <p:attrName>style.visibility</p:attrName>
@@ -5703,7 +5667,7 @@
                                       <p:cBhvr>
                                         <p:cTn id="9" dur="529" fill="hold"/>
                                         <p:tgtEl>
-                                          <p:spTgt spid="570017508"/>
+                                          <p:spTgt spid="980474211"/>
                                         </p:tgtEl>
                                         <p:attrNameLst>
                                           <p:attrName>ppt_w</p:attrName>
@@ -5726,7 +5690,7 @@
                                       <p:cBhvr>
                                         <p:cTn id="8" dur="529" fill="hold"/>
                                         <p:tgtEl>
-                                          <p:spTgt spid="570017508"/>
+                                          <p:spTgt spid="980474211"/>
                                         </p:tgtEl>
                                         <p:attrNameLst>
                                           <p:attrName>ppt_h</p:attrName>
@@ -5749,7 +5713,7 @@
                                       <p:cBhvr>
                                         <p:cTn id="7" dur="529" fill="hold"/>
                                         <p:tgtEl>
-                                          <p:spTgt spid="570017508"/>
+                                          <p:spTgt spid="980474211"/>
                                         </p:tgtEl>
                                         <p:attrNameLst>
                                           <p:attrName>style.rotation</p:attrName>
@@ -5772,7 +5736,7 @@
                                       <p:cBhvr>
                                         <p:cTn id="6" dur="529"/>
                                         <p:tgtEl>
-                                          <p:spTgt spid="570017508"/>
+                                          <p:spTgt spid="980474211"/>
                                         </p:tgtEl>
                                       </p:cBhvr>
                                     </p:animEffect>
@@ -5847,7 +5811,7 @@
       </p:grpSpPr>
       <p:sp>
         <p:nvSpPr>
-          <p:cNvPr id="437463357" name="Title 1"/>
+          <p:cNvPr id="1261695690" name="Title 1"/>
           <p:cNvSpPr>
             <a:spLocks noGrp="1"/>
           </p:cNvSpPr>
@@ -5886,7 +5850,7 @@
       </p:sp>
       <p:sp>
         <p:nvSpPr>
-          <p:cNvPr id="851587387" name="Marcador de contenido 2"/>
+          <p:cNvPr id="384983257" name="Marcador de contenido 2"/>
           <p:cNvSpPr>
             <a:spLocks noGrp="1"/>
           </p:cNvSpPr>
@@ -5976,7 +5940,7 @@
       </p:sp>
       <p:pic>
         <p:nvPicPr>
-          <p:cNvPr id="726295001" name=""/>
+          <p:cNvPr id="1470697145" name=""/>
           <p:cNvPicPr>
             <a:picLocks noChangeAspect="1"/>
           </p:cNvPicPr>
@@ -6050,7 +6014,7 @@
                                           </p:stCondLst>
                                         </p:cTn>
                                         <p:tgtEl>
-                                          <p:spTgt spid="437463357"/>
+                                          <p:spTgt spid="1261695690"/>
                                         </p:tgtEl>
                                         <p:attrNameLst>
                                           <p:attrName>style.visibility</p:attrName>
@@ -6064,7 +6028,7 @@
                                       <p:cBhvr additive="base">
                                         <p:cTn id="17" dur="500" fill="hold"/>
                                         <p:tgtEl>
-                                          <p:spTgt spid="437463357"/>
+                                          <p:spTgt spid="1261695690"/>
                                         </p:tgtEl>
                                         <p:attrNameLst>
                                           <p:attrName>ppt_x</p:attrName>
@@ -6087,7 +6051,7 @@
                                       <p:cBhvr additive="base">
                                         <p:cTn id="16" dur="500" fill="hold"/>
                                         <p:tgtEl>
-                                          <p:spTgt spid="437463357"/>
+                                          <p:spTgt spid="1261695690"/>
                                         </p:tgtEl>
                                         <p:attrNameLst>
                                           <p:attrName>ppt_y</p:attrName>
@@ -6132,7 +6096,7 @@
                                           </p:stCondLst>
                                         </p:cTn>
                                         <p:tgtEl>
-                                          <p:spTgt spid="851587387"/>
+                                          <p:spTgt spid="384983257"/>
                                         </p:tgtEl>
                                         <p:attrNameLst>
                                           <p:attrName>style.visibility</p:attrName>
@@ -6146,7 +6110,7 @@
                                       <p:cBhvr>
                                         <p:cTn id="12" dur="893" fill="hold"/>
                                         <p:tgtEl>
-                                          <p:spTgt spid="851587387"/>
+                                          <p:spTgt spid="384983257"/>
                                         </p:tgtEl>
                                         <p:attrNameLst>
                                           <p:attrName>ppt_w</p:attrName>
@@ -6169,7 +6133,7 @@
                                       <p:cBhvr>
                                         <p:cTn id="11" dur="893" fill="hold"/>
                                         <p:tgtEl>
-                                          <p:spTgt spid="851587387"/>
+                                          <p:spTgt spid="384983257"/>
                                         </p:tgtEl>
                                         <p:attrNameLst>
                                           <p:attrName>ppt_h</p:attrName>
@@ -6192,7 +6156,7 @@
                                       <p:cBhvr>
                                         <p:cTn id="10" dur="893"/>
                                         <p:tgtEl>
-                                          <p:spTgt spid="851587387"/>
+                                          <p:spTgt spid="384983257"/>
                                         </p:tgtEl>
                                       </p:cBhvr>
                                     </p:animEffect>
@@ -6222,7 +6186,7 @@
                                           </p:stCondLst>
                                         </p:cTn>
                                         <p:tgtEl>
-                                          <p:spTgt spid="726295001"/>
+                                          <p:spTgt spid="1470697145"/>
                                         </p:tgtEl>
                                         <p:attrNameLst>
                                           <p:attrName>style.visibility</p:attrName>
@@ -6236,7 +6200,7 @@
                                       <p:cBhvr>
                                         <p:cTn id="6" dur="971"/>
                                         <p:tgtEl>
-                                          <p:spTgt spid="726295001"/>
+                                          <p:spTgt spid="1470697145"/>
                                         </p:tgtEl>
                                       </p:cBhvr>
                                     </p:animEffect>
@@ -6311,7 +6275,7 @@
       </p:grpSpPr>
       <p:sp>
         <p:nvSpPr>
-          <p:cNvPr id="777508170" name="Title 1"/>
+          <p:cNvPr id="490714291" name="Title 1"/>
           <p:cNvSpPr>
             <a:spLocks noGrp="1"/>
           </p:cNvSpPr>
@@ -6357,7 +6321,7 @@
       </p:sp>
       <p:sp>
         <p:nvSpPr>
-          <p:cNvPr id="337024460" name="Marcador de contenido 2"/>
+          <p:cNvPr id="505250104" name="Marcador de contenido 2"/>
           <p:cNvSpPr>
             <a:spLocks noGrp="1"/>
           </p:cNvSpPr>
@@ -6405,7 +6369,7 @@
       </p:sp>
       <p:sp>
         <p:nvSpPr>
-          <p:cNvPr id="1236470474" name=""/>
+          <p:cNvPr id="1579102840" name=""/>
           <p:cNvSpPr/>
           <p:nvPr/>
         </p:nvSpPr>
@@ -6450,7 +6414,7 @@
       </p:sp>
       <p:pic>
         <p:nvPicPr>
-          <p:cNvPr id="261219976" name=""/>
+          <p:cNvPr id="1569856862" name=""/>
           <p:cNvPicPr>
             <a:picLocks noChangeAspect="1"/>
           </p:cNvPicPr>
@@ -6524,7 +6488,7 @@
                                           </p:stCondLst>
                                         </p:cTn>
                                         <p:tgtEl>
-                                          <p:spTgt spid="777508170"/>
+                                          <p:spTgt spid="490714291"/>
                                         </p:tgtEl>
                                         <p:attrNameLst>
                                           <p:attrName>style.visibility</p:attrName>
@@ -6538,7 +6502,7 @@
                                       <p:cBhvr>
                                         <p:cTn id="22" dur="811"/>
                                         <p:tgtEl>
-                                          <p:spTgt spid="777508170"/>
+                                          <p:spTgt spid="490714291"/>
                                         </p:tgtEl>
                                       </p:cBhvr>
                                     </p:animEffect>
@@ -6568,7 +6532,7 @@
                                           </p:stCondLst>
                                         </p:cTn>
                                         <p:tgtEl>
-                                          <p:spTgt spid="1236470474"/>
+                                          <p:spTgt spid="1579102840"/>
                                         </p:tgtEl>
                                         <p:attrNameLst>
                                           <p:attrName>style.visibility</p:attrName>
@@ -6582,7 +6546,7 @@
                                       <p:cBhvr>
                                         <p:cTn id="18" dur="1000" fill="hold"/>
                                         <p:tgtEl>
-                                          <p:spTgt spid="1236470474"/>
+                                          <p:spTgt spid="1579102840"/>
                                         </p:tgtEl>
                                         <p:attrNameLst>
                                           <p:attrName>ppt_w</p:attrName>
@@ -6605,7 +6569,7 @@
                                       <p:cBhvr>
                                         <p:cTn id="17" dur="1000" fill="hold"/>
                                         <p:tgtEl>
-                                          <p:spTgt spid="1236470474"/>
+                                          <p:spTgt spid="1579102840"/>
                                         </p:tgtEl>
                                         <p:attrNameLst>
                                           <p:attrName>ppt_h</p:attrName>
@@ -6628,7 +6592,7 @@
                                       <p:cBhvr>
                                         <p:cTn id="16" dur="1000" fill="hold"/>
                                         <p:tgtEl>
-                                          <p:spTgt spid="1236470474"/>
+                                          <p:spTgt spid="1579102840"/>
                                         </p:tgtEl>
                                         <p:attrNameLst>
                                           <p:attrName>style.rotation</p:attrName>
@@ -6651,7 +6615,7 @@
                                       <p:cBhvr>
                                         <p:cTn id="15" dur="1000"/>
                                         <p:tgtEl>
-                                          <p:spTgt spid="1236470474"/>
+                                          <p:spTgt spid="1579102840"/>
                                         </p:tgtEl>
                                       </p:cBhvr>
                                     </p:animEffect>
@@ -6681,7 +6645,7 @@
                                           </p:stCondLst>
                                         </p:cTn>
                                         <p:tgtEl>
-                                          <p:spTgt spid="261219976"/>
+                                          <p:spTgt spid="1569856862"/>
                                         </p:tgtEl>
                                         <p:attrNameLst>
                                           <p:attrName>style.visibility</p:attrName>
@@ -6695,7 +6659,7 @@
                                       <p:cBhvr>
                                         <p:cTn id="11" dur="988"/>
                                         <p:tgtEl>
-                                          <p:spTgt spid="261219976"/>
+                                          <p:spTgt spid="1569856862"/>
                                         </p:tgtEl>
                                       </p:cBhvr>
                                     </p:animEffect>
@@ -6725,7 +6689,7 @@
                                           </p:stCondLst>
                                         </p:cTn>
                                         <p:tgtEl>
-                                          <p:spTgt spid="337024460"/>
+                                          <p:spTgt spid="505250104"/>
                                         </p:tgtEl>
                                         <p:attrNameLst>
                                           <p:attrName>style.visibility</p:attrName>
@@ -6739,7 +6703,7 @@
                                       <p:cBhvr additive="base">
                                         <p:cTn id="7" dur="777" fill="hold"/>
                                         <p:tgtEl>
-                                          <p:spTgt spid="337024460"/>
+                                          <p:spTgt spid="505250104"/>
                                         </p:tgtEl>
                                         <p:attrNameLst>
                                           <p:attrName>ppt_x</p:attrName>
@@ -6762,7 +6726,7 @@
                                       <p:cBhvr additive="base">
                                         <p:cTn id="6" dur="777" fill="hold"/>
                                         <p:tgtEl>
-                                          <p:spTgt spid="337024460"/>
+                                          <p:spTgt spid="505250104"/>
                                         </p:tgtEl>
                                         <p:attrNameLst>
                                           <p:attrName>ppt_y</p:attrName>
@@ -6852,7 +6816,7 @@
       </p:grpSpPr>
       <p:sp>
         <p:nvSpPr>
-          <p:cNvPr id="1536494457" name="Title 1"/>
+          <p:cNvPr id="112239833" name="Title 1"/>
           <p:cNvSpPr>
             <a:spLocks noGrp="1"/>
           </p:cNvSpPr>
@@ -6901,7 +6865,7 @@
       </p:sp>
       <p:sp>
         <p:nvSpPr>
-          <p:cNvPr id="1877028094" name="Marcador de contenido 2"/>
+          <p:cNvPr id="1589568948" name="Marcador de contenido 2"/>
           <p:cNvSpPr>
             <a:spLocks noGrp="1"/>
           </p:cNvSpPr>
@@ -7040,7 +7004,7 @@
                                           </p:stCondLst>
                                         </p:cTn>
                                         <p:tgtEl>
-                                          <p:spTgt spid="1536494457"/>
+                                          <p:spTgt spid="112239833"/>
                                         </p:tgtEl>
                                         <p:attrNameLst>
                                           <p:attrName>style.visibility</p:attrName>
@@ -7054,7 +7018,7 @@
                                       <p:cBhvr>
                                         <p:cTn id="13" dur="1305"/>
                                         <p:tgtEl>
-                                          <p:spTgt spid="1536494457"/>
+                                          <p:spTgt spid="112239833"/>
                                         </p:tgtEl>
                                       </p:cBhvr>
                                     </p:animEffect>
@@ -7084,7 +7048,7 @@
                                           </p:stCondLst>
                                         </p:cTn>
                                         <p:tgtEl>
-                                          <p:spTgt spid="1877028094"/>
+                                          <p:spTgt spid="1589568948"/>
                                         </p:tgtEl>
                                         <p:attrNameLst>
                                           <p:attrName>style.visibility</p:attrName>
@@ -7098,7 +7062,7 @@
                                       <p:cBhvr>
                                         <p:cTn id="9" dur="1000" fill="hold"/>
                                         <p:tgtEl>
-                                          <p:spTgt spid="1877028094"/>
+                                          <p:spTgt spid="1589568948"/>
                                         </p:tgtEl>
                                         <p:attrNameLst>
                                           <p:attrName>ppt_w</p:attrName>
@@ -7121,7 +7085,7 @@
                                       <p:cBhvr>
                                         <p:cTn id="8" dur="1000" fill="hold"/>
                                         <p:tgtEl>
-                                          <p:spTgt spid="1877028094"/>
+                                          <p:spTgt spid="1589568948"/>
                                         </p:tgtEl>
                                         <p:attrNameLst>
                                           <p:attrName>ppt_h</p:attrName>
@@ -7144,7 +7108,7 @@
                                       <p:cBhvr>
                                         <p:cTn id="7" dur="1000" fill="hold"/>
                                         <p:tgtEl>
-                                          <p:spTgt spid="1877028094"/>
+                                          <p:spTgt spid="1589568948"/>
                                         </p:tgtEl>
                                         <p:attrNameLst>
                                           <p:attrName>style.rotation</p:attrName>
@@ -7167,7 +7131,7 @@
                                       <p:cBhvr>
                                         <p:cTn id="6" dur="1000"/>
                                         <p:tgtEl>
-                                          <p:spTgt spid="1877028094"/>
+                                          <p:spTgt spid="1589568948"/>
                                         </p:tgtEl>
                                       </p:cBhvr>
                                     </p:animEffect>
@@ -7242,7 +7206,7 @@
       </p:grpSpPr>
       <p:sp>
         <p:nvSpPr>
-          <p:cNvPr id="828048584" name="Title 1"/>
+          <p:cNvPr id="1884401782" name="Title 1"/>
           <p:cNvSpPr>
             <a:spLocks noGrp="1"/>
           </p:cNvSpPr>
@@ -7285,7 +7249,7 @@
       </p:sp>
       <p:pic>
         <p:nvPicPr>
-          <p:cNvPr id="1326782255" name=""/>
+          <p:cNvPr id="1823997291" name=""/>
           <p:cNvPicPr>
             <a:picLocks noChangeAspect="1"/>
           </p:cNvPicPr>
@@ -7293,19 +7257,81 @@
         </p:nvPicPr>
         <p:blipFill>
           <a:blip r:embed="rId3"/>
-          <a:srcRect l="6193" t="6236" r="7079" b="7921"/>
+          <a:srcRect l="6193" t="6236" r="7078" b="7921"/>
           <a:stretch/>
         </p:blipFill>
         <p:spPr bwMode="auto">
           <a:xfrm flipH="0" flipV="0">
-            <a:off x="997086" y="4823669"/>
-            <a:ext cx="1712752" cy="1695274"/>
+            <a:off x="1517226" y="4823668"/>
+            <a:ext cx="1949510" cy="1929616"/>
           </a:xfrm>
           <a:prstGeom prst="rect">
             <a:avLst/>
           </a:prstGeom>
         </p:spPr>
       </p:pic>
+      <p:sp>
+        <p:nvSpPr>
+          <p:cNvPr id="245705186" name="Título 1"/>
+          <p:cNvSpPr>
+            <a:spLocks noGrp="1"/>
+          </p:cNvSpPr>
+          <p:nvPr/>
+        </p:nvSpPr>
+        <p:spPr bwMode="auto">
+          <a:xfrm flipH="0" flipV="0">
+            <a:off x="300556" y="4091779"/>
+            <a:ext cx="3342569" cy="731889"/>
+          </a:xfrm>
+          <a:prstGeom prst="rect">
+            <a:avLst/>
+          </a:prstGeom>
+          <a:ln w="0">
+            <a:noFill/>
+          </a:ln>
+        </p:spPr>
+        <p:txBody>
+          <a:bodyPr vertOverflow="overflow" horzOverflow="overflow" vert="horz" wrap="square" lIns="91440" tIns="45720" rIns="91440" bIns="45720" numCol="1" spcCol="0" rtlCol="0" fromWordArt="0" anchor="ctr" anchorCtr="0" forceAA="0" upright="0" compatLnSpc="0">
+            <a:normAutofit/>
+          </a:bodyPr>
+          <a:lstStyle>
+            <a:lvl1pPr algn="l" defTabSz="914400">
+              <a:lnSpc>
+                <a:spcPct val="90000"/>
+              </a:lnSpc>
+              <a:spcBef>
+                <a:spcPts val="0"/>
+              </a:spcBef>
+              <a:buNone/>
+              <a:defRPr sz="4400">
+                <a:solidFill>
+                  <a:schemeClr val="tx1"/>
+                </a:solidFill>
+                <a:latin typeface="+mj-lt"/>
+                <a:ea typeface="+mj-ea"/>
+                <a:cs typeface="+mj-cs"/>
+              </a:defRPr>
+            </a:lvl1pPr>
+          </a:lstStyle>
+          <a:p>
+            <a:pPr>
+              <a:defRPr/>
+            </a:pPr>
+            <a:r>
+              <a:rPr sz="1800">
+                <a:solidFill>
+                  <a:schemeClr val="bg1"/>
+                </a:solidFill>
+                <a:latin typeface="Hack"/>
+                <a:ea typeface="Hack"/>
+                <a:cs typeface="Hack"/>
+              </a:rPr>
+              <a:t>Escanéalo para ver y descargar el proyecto:</a:t>
+            </a:r>
+            <a:endParaRPr sz="1800"/>
+          </a:p>
+        </p:txBody>
+      </p:sp>
     </p:spTree>
   </p:cSld>
   <p:clrMapOvr>
@@ -7341,26 +7367,26 @@
                       </p:stCondLst>
                       <p:childTnLst>
                         <p:par>
-                          <p:cTn id="4" fill="hold">
+                          <p:cTn id="28" fill="hold">
                             <p:stCondLst>
                               <p:cond delay="0"/>
                             </p:stCondLst>
                             <p:childTnLst>
                               <p:par>
-                                <p:cTn id="5" presetID="45" presetClass="entr" presetSubtype="0" fill="hold" grpId="0" nodeType="withEffect">
+                                <p:cTn id="29" presetID="45" presetClass="entr" presetSubtype="0" fill="hold" grpId="0" nodeType="withEffect">
                                   <p:stCondLst>
                                     <p:cond delay="0"/>
                                   </p:stCondLst>
                                   <p:childTnLst>
                                     <p:set>
                                       <p:cBhvr>
-                                        <p:cTn id="9" dur="1" fill="hold">
+                                        <p:cTn id="33" dur="1" fill="hold">
                                           <p:stCondLst>
                                             <p:cond delay="0"/>
                                           </p:stCondLst>
                                         </p:cTn>
                                         <p:tgtEl>
-                                          <p:spTgt spid="828048584"/>
+                                          <p:spTgt spid="1884401782"/>
                                         </p:tgtEl>
                                         <p:attrNameLst>
                                           <p:attrName>style.visibility</p:attrName>
@@ -7372,17 +7398,17 @@
                                     </p:set>
                                     <p:animEffect transition="in" filter="fade">
                                       <p:cBhvr>
-                                        <p:cTn id="8" dur="2000"/>
-                                        <p:tgtEl>
-                                          <p:spTgt spid="828048584"/>
+                                        <p:cTn id="32" dur="1764"/>
+                                        <p:tgtEl>
+                                          <p:spTgt spid="1884401782"/>
                                         </p:tgtEl>
                                       </p:cBhvr>
                                     </p:animEffect>
                                     <p:anim calcmode="lin" valueType="num">
                                       <p:cBhvr>
-                                        <p:cTn id="7" dur="2000" fill="hold"/>
-                                        <p:tgtEl>
-                                          <p:spTgt spid="828048584"/>
+                                        <p:cTn id="31" dur="1764" fill="hold"/>
+                                        <p:tgtEl>
+                                          <p:spTgt spid="1884401782"/>
                                         </p:tgtEl>
                                         <p:attrNameLst>
                                           <p:attrName>ppt_w</p:attrName>
@@ -7403,9 +7429,9 @@
                                     </p:anim>
                                     <p:anim calcmode="lin" valueType="num">
                                       <p:cBhvr>
-                                        <p:cTn id="6" dur="2000" fill="hold"/>
-                                        <p:tgtEl>
-                                          <p:spTgt spid="828048584"/>
+                                        <p:cTn id="30" dur="1764" fill="hold"/>
+                                        <p:tgtEl>
+                                          <p:spTgt spid="1884401782"/>
                                         </p:tgtEl>
                                         <p:attrNameLst>
                                           <p:attrName>ppt_h</p:attrName>
@@ -7424,6 +7450,406 @@
                                         </p:tav>
                                       </p:tavLst>
                                     </p:anim>
+                                  </p:childTnLst>
+                                </p:cTn>
+                              </p:par>
+                            </p:childTnLst>
+                          </p:cTn>
+                        </p:par>
+                        <p:par>
+                          <p:cTn id="11" fill="hold">
+                            <p:stCondLst>
+                              <p:cond delay="1764"/>
+                            </p:stCondLst>
+                            <p:childTnLst>
+                              <p:par>
+                                <p:cTn id="12" presetID="26" presetClass="entr" presetSubtype="0" fill="hold" grpId="0" nodeType="afterEffect">
+                                  <p:stCondLst>
+                                    <p:cond delay="0"/>
+                                  </p:stCondLst>
+                                  <p:childTnLst>
+                                    <p:set>
+                                      <p:cBhvr>
+                                        <p:cTn id="27" dur="1" fill="hold">
+                                          <p:stCondLst>
+                                            <p:cond delay="0"/>
+                                          </p:stCondLst>
+                                        </p:cTn>
+                                        <p:tgtEl>
+                                          <p:spTgt spid="245705186"/>
+                                        </p:tgtEl>
+                                        <p:attrNameLst>
+                                          <p:attrName>style.visibility</p:attrName>
+                                        </p:attrNameLst>
+                                      </p:cBhvr>
+                                      <p:to>
+                                        <p:strVal val="visible"/>
+                                      </p:to>
+                                    </p:set>
+                                    <p:animEffect transition="in" filter="wipe(down)">
+                                      <p:cBhvr>
+                                        <p:cTn id="26" dur="433">
+                                          <p:stCondLst>
+                                            <p:cond delay="0"/>
+                                          </p:stCondLst>
+                                        </p:cTn>
+                                        <p:tgtEl>
+                                          <p:spTgt spid="245705186"/>
+                                        </p:tgtEl>
+                                      </p:cBhvr>
+                                    </p:animEffect>
+                                    <p:anim calcmode="lin" valueType="num">
+                                      <p:cBhvr>
+                                        <p:cTn id="25" dur="1360" tmFilter="0,0; 0.14,0.36; 0.43,0.73; 0.71,0.91; 1.0,1.0">
+                                          <p:stCondLst>
+                                            <p:cond delay="0"/>
+                                          </p:stCondLst>
+                                        </p:cTn>
+                                        <p:tgtEl>
+                                          <p:spTgt spid="245705186"/>
+                                        </p:tgtEl>
+                                        <p:attrNameLst>
+                                          <p:attrName>ppt_x</p:attrName>
+                                        </p:attrNameLst>
+                                      </p:cBhvr>
+                                      <p:tavLst>
+                                        <p:tav tm="0">
+                                          <p:val>
+                                            <p:strVal val="#ppt_x-0.25"/>
+                                          </p:val>
+                                        </p:tav>
+                                        <p:tav tm="100000">
+                                          <p:val>
+                                            <p:strVal val="#ppt_x"/>
+                                          </p:val>
+                                        </p:tav>
+                                      </p:tavLst>
+                                    </p:anim>
+                                    <p:anim calcmode="lin" valueType="num">
+                                      <p:cBhvr>
+                                        <p:cTn id="24" dur="496" tmFilter="0.0,0.0; 0.25,0.07; 0.50,0.2; 0.75,0.467; 1.0,1.0">
+                                          <p:stCondLst>
+                                            <p:cond delay="0"/>
+                                          </p:stCondLst>
+                                        </p:cTn>
+                                        <p:tgtEl>
+                                          <p:spTgt spid="245705186"/>
+                                        </p:tgtEl>
+                                        <p:attrNameLst>
+                                          <p:attrName>ppt_y</p:attrName>
+                                        </p:attrNameLst>
+                                      </p:cBhvr>
+                                      <p:tavLst>
+                                        <p:tav tm="0" fmla="#ppt_y-sin(pi*$)/3">
+                                          <p:val>
+                                            <p:fltVal val="0.5"/>
+                                          </p:val>
+                                        </p:tav>
+                                        <p:tav tm="100000">
+                                          <p:val>
+                                            <p:fltVal val="1"/>
+                                          </p:val>
+                                        </p:tav>
+                                      </p:tavLst>
+                                    </p:anim>
+                                    <p:anim calcmode="lin" valueType="num">
+                                      <p:cBhvr>
+                                        <p:cTn id="23" dur="496" tmFilter="0, 0; 0.125,0.2665; 0.25,0.4; 0.375,0.465; 0.5,0.5;  0.625,0.535; 0.75,0.6; 0.875,0.7335; 1,1">
+                                          <p:stCondLst>
+                                            <p:cond delay="496"/>
+                                          </p:stCondLst>
+                                        </p:cTn>
+                                        <p:tgtEl>
+                                          <p:spTgt spid="245705186"/>
+                                        </p:tgtEl>
+                                        <p:attrNameLst>
+                                          <p:attrName>ppt_y</p:attrName>
+                                        </p:attrNameLst>
+                                      </p:cBhvr>
+                                      <p:tavLst>
+                                        <p:tav tm="0" fmla="#ppt_y-sin(pi*$)/9">
+                                          <p:val>
+                                            <p:fltVal val="0"/>
+                                          </p:val>
+                                        </p:tav>
+                                        <p:tav tm="100000">
+                                          <p:val>
+                                            <p:fltVal val="1"/>
+                                          </p:val>
+                                        </p:tav>
+                                      </p:tavLst>
+                                    </p:anim>
+                                    <p:anim calcmode="lin" valueType="num">
+                                      <p:cBhvr>
+                                        <p:cTn id="22" dur="248" tmFilter="0, 0; 0.125,0.2665; 0.25,0.4; 0.375,0.465; 0.5,0.5;  0.625,0.535; 0.75,0.6; 0.875,0.7335; 1,1">
+                                          <p:stCondLst>
+                                            <p:cond delay="988"/>
+                                          </p:stCondLst>
+                                        </p:cTn>
+                                        <p:tgtEl>
+                                          <p:spTgt spid="245705186"/>
+                                        </p:tgtEl>
+                                        <p:attrNameLst>
+                                          <p:attrName>ppt_y</p:attrName>
+                                        </p:attrNameLst>
+                                      </p:cBhvr>
+                                      <p:tavLst>
+                                        <p:tav tm="0" fmla="#ppt_y-sin(pi*$)/27">
+                                          <p:val>
+                                            <p:fltVal val="0"/>
+                                          </p:val>
+                                        </p:tav>
+                                        <p:tav tm="100000">
+                                          <p:val>
+                                            <p:fltVal val="1"/>
+                                          </p:val>
+                                        </p:tav>
+                                      </p:tavLst>
+                                    </p:anim>
+                                    <p:anim calcmode="lin" valueType="num">
+                                      <p:cBhvr>
+                                        <p:cTn id="21" dur="122" tmFilter="0, 0; 0.125,0.2665; 0.25,0.4; 0.375,0.465; 0.5,0.5;  0.625,0.535; 0.75,0.6; 0.875,0.7335; 1,1">
+                                          <p:stCondLst>
+                                            <p:cond delay="1236"/>
+                                          </p:stCondLst>
+                                        </p:cTn>
+                                        <p:tgtEl>
+                                          <p:spTgt spid="245705186"/>
+                                        </p:tgtEl>
+                                        <p:attrNameLst>
+                                          <p:attrName>ppt_y</p:attrName>
+                                        </p:attrNameLst>
+                                      </p:cBhvr>
+                                      <p:tavLst>
+                                        <p:tav tm="0" fmla="#ppt_y-sin(pi*$)/81">
+                                          <p:val>
+                                            <p:fltVal val="0"/>
+                                          </p:val>
+                                        </p:tav>
+                                        <p:tav tm="100000">
+                                          <p:val>
+                                            <p:fltVal val="1"/>
+                                          </p:val>
+                                        </p:tav>
+                                      </p:tavLst>
+                                    </p:anim>
+                                    <p:animScale>
+                                      <p:cBhvr>
+                                        <p:cTn id="20" dur="19">
+                                          <p:stCondLst>
+                                            <p:cond delay="485"/>
+                                          </p:stCondLst>
+                                        </p:cTn>
+                                        <p:tgtEl>
+                                          <p:spTgt spid="245705186"/>
+                                        </p:tgtEl>
+                                      </p:cBhvr>
+                                      <p:to x="100000" y="60000"/>
+                                    </p:animScale>
+                                    <p:animScale>
+                                      <p:cBhvr>
+                                        <p:cTn id="19" dur="124" decel="50000">
+                                          <p:stCondLst>
+                                            <p:cond delay="505"/>
+                                          </p:stCondLst>
+                                        </p:cTn>
+                                        <p:tgtEl>
+                                          <p:spTgt spid="245705186"/>
+                                        </p:tgtEl>
+                                      </p:cBhvr>
+                                      <p:to x="100000" y="100000"/>
+                                    </p:animScale>
+                                    <p:animScale>
+                                      <p:cBhvr>
+                                        <p:cTn id="18" dur="19">
+                                          <p:stCondLst>
+                                            <p:cond delay="979"/>
+                                          </p:stCondLst>
+                                        </p:cTn>
+                                        <p:tgtEl>
+                                          <p:spTgt spid="245705186"/>
+                                        </p:tgtEl>
+                                      </p:cBhvr>
+                                      <p:to x="100000" y="80000"/>
+                                    </p:animScale>
+                                    <p:animScale>
+                                      <p:cBhvr>
+                                        <p:cTn id="17" dur="124" decel="50000">
+                                          <p:stCondLst>
+                                            <p:cond delay="999"/>
+                                          </p:stCondLst>
+                                        </p:cTn>
+                                        <p:tgtEl>
+                                          <p:spTgt spid="245705186"/>
+                                        </p:tgtEl>
+                                      </p:cBhvr>
+                                      <p:to x="100000" y="100000"/>
+                                    </p:animScale>
+                                    <p:animScale>
+                                      <p:cBhvr>
+                                        <p:cTn id="16" dur="19">
+                                          <p:stCondLst>
+                                            <p:cond delay="1226"/>
+                                          </p:stCondLst>
+                                        </p:cTn>
+                                        <p:tgtEl>
+                                          <p:spTgt spid="245705186"/>
+                                        </p:tgtEl>
+                                      </p:cBhvr>
+                                      <p:to x="100000" y="90000"/>
+                                    </p:animScale>
+                                    <p:animScale>
+                                      <p:cBhvr>
+                                        <p:cTn id="15" dur="124" decel="50000">
+                                          <p:stCondLst>
+                                            <p:cond delay="1245"/>
+                                          </p:stCondLst>
+                                        </p:cTn>
+                                        <p:tgtEl>
+                                          <p:spTgt spid="245705186"/>
+                                        </p:tgtEl>
+                                      </p:cBhvr>
+                                      <p:to x="100000" y="100000"/>
+                                    </p:animScale>
+                                    <p:animScale>
+                                      <p:cBhvr>
+                                        <p:cTn id="14" dur="19">
+                                          <p:stCondLst>
+                                            <p:cond delay="1350"/>
+                                          </p:stCondLst>
+                                        </p:cTn>
+                                        <p:tgtEl>
+                                          <p:spTgt spid="245705186"/>
+                                        </p:tgtEl>
+                                      </p:cBhvr>
+                                      <p:to x="100000" y="95000"/>
+                                    </p:animScale>
+                                    <p:animScale>
+                                      <p:cBhvr>
+                                        <p:cTn id="13" dur="124" decel="50000">
+                                          <p:stCondLst>
+                                            <p:cond delay="1369"/>
+                                          </p:stCondLst>
+                                        </p:cTn>
+                                        <p:tgtEl>
+                                          <p:spTgt spid="245705186"/>
+                                        </p:tgtEl>
+                                      </p:cBhvr>
+                                      <p:to x="100000" y="100000"/>
+                                    </p:animScale>
+                                  </p:childTnLst>
+                                </p:cTn>
+                              </p:par>
+                            </p:childTnLst>
+                          </p:cTn>
+                        </p:par>
+                        <p:par>
+                          <p:cTn id="4" fill="hold">
+                            <p:stCondLst>
+                              <p:cond delay="3257"/>
+                            </p:stCondLst>
+                            <p:childTnLst>
+                              <p:par>
+                                <p:cTn id="5" presetID="31" presetClass="entr" presetSubtype="0" fill="hold" grpId="0" nodeType="afterEffect">
+                                  <p:stCondLst>
+                                    <p:cond delay="0"/>
+                                  </p:stCondLst>
+                                  <p:childTnLst>
+                                    <p:set>
+                                      <p:cBhvr>
+                                        <p:cTn id="10" dur="1" fill="hold">
+                                          <p:stCondLst>
+                                            <p:cond delay="0"/>
+                                          </p:stCondLst>
+                                        </p:cTn>
+                                        <p:tgtEl>
+                                          <p:spTgt spid="1823997291"/>
+                                        </p:tgtEl>
+                                        <p:attrNameLst>
+                                          <p:attrName>style.visibility</p:attrName>
+                                        </p:attrNameLst>
+                                      </p:cBhvr>
+                                      <p:to>
+                                        <p:strVal val="visible"/>
+                                      </p:to>
+                                    </p:set>
+                                    <p:anim calcmode="lin" valueType="num">
+                                      <p:cBhvr>
+                                        <p:cTn id="9" dur="1000" fill="hold"/>
+                                        <p:tgtEl>
+                                          <p:spTgt spid="1823997291"/>
+                                        </p:tgtEl>
+                                        <p:attrNameLst>
+                                          <p:attrName>ppt_w</p:attrName>
+                                        </p:attrNameLst>
+                                      </p:cBhvr>
+                                      <p:tavLst>
+                                        <p:tav tm="0">
+                                          <p:val>
+                                            <p:fltVal val="0"/>
+                                          </p:val>
+                                        </p:tav>
+                                        <p:tav tm="100000">
+                                          <p:val>
+                                            <p:strVal val="#ppt_w"/>
+                                          </p:val>
+                                        </p:tav>
+                                      </p:tavLst>
+                                    </p:anim>
+                                    <p:anim calcmode="lin" valueType="num">
+                                      <p:cBhvr>
+                                        <p:cTn id="8" dur="1000" fill="hold"/>
+                                        <p:tgtEl>
+                                          <p:spTgt spid="1823997291"/>
+                                        </p:tgtEl>
+                                        <p:attrNameLst>
+                                          <p:attrName>ppt_h</p:attrName>
+                                        </p:attrNameLst>
+                                      </p:cBhvr>
+                                      <p:tavLst>
+                                        <p:tav tm="0">
+                                          <p:val>
+                                            <p:fltVal val="0"/>
+                                          </p:val>
+                                        </p:tav>
+                                        <p:tav tm="100000">
+                                          <p:val>
+                                            <p:strVal val="#ppt_h"/>
+                                          </p:val>
+                                        </p:tav>
+                                      </p:tavLst>
+                                    </p:anim>
+                                    <p:anim calcmode="lin" valueType="num">
+                                      <p:cBhvr>
+                                        <p:cTn id="7" dur="1000" fill="hold"/>
+                                        <p:tgtEl>
+                                          <p:spTgt spid="1823997291"/>
+                                        </p:tgtEl>
+                                        <p:attrNameLst>
+                                          <p:attrName>style.rotation</p:attrName>
+                                        </p:attrNameLst>
+                                      </p:cBhvr>
+                                      <p:tavLst>
+                                        <p:tav tm="0">
+                                          <p:val>
+                                            <p:fltVal val="90"/>
+                                          </p:val>
+                                        </p:tav>
+                                        <p:tav tm="100000">
+                                          <p:val>
+                                            <p:fltVal val="0"/>
+                                          </p:val>
+                                        </p:tav>
+                                      </p:tavLst>
+                                    </p:anim>
+                                    <p:animEffect transition="in" filter="fade">
+                                      <p:cBhvr>
+                                        <p:cTn id="6" dur="1000"/>
+                                        <p:tgtEl>
+                                          <p:spTgt spid="1823997291"/>
+                                        </p:tgtEl>
+                                      </p:cBhvr>
+                                    </p:animEffect>
                                   </p:childTnLst>
                                 </p:cTn>
                               </p:par>

</xml_diff>